<commit_message>
Apresntações PR e DE
</commit_message>
<xml_diff>
--- a/aulas/t/SOP-T1-1PR.pptx
+++ b/aulas/t/SOP-T1-1PR.pptx
@@ -22155,7 +22155,7 @@
             </a:pPr>
             <a:r>
               <a:rPr lang="pt-PT" sz="2000" i="0" dirty="0"/>
-              <a:t>3 conjuntos (processos, secções críticas e escalonamento) 2 questões (em 5 possíveis)</a:t>
+              <a:t>3 conjuntos (processos, secções críticas e escalonamento) 3 questões (em 5 possíveis)</a:t>
             </a:r>
             <a:r>
               <a:rPr lang="pt-PT" sz="2000" b="0" i="0" dirty="0"/>
@@ -22180,19 +22180,11 @@
             </a:r>
             <a:r>
               <a:rPr lang="pt-PT" sz="2000" b="0" i="0" dirty="0"/>
-              <a:t>até </a:t>
-            </a:r>
-            <a:r>
-              <a:rPr lang="pt-PT" sz="2000" b="0" i="0"/>
-              <a:t>às </a:t>
-            </a:r>
-            <a:r>
-              <a:rPr lang="pt-PT" sz="2000" i="0"/>
-              <a:t>24h </a:t>
+              <a:t>até às </a:t>
             </a:r>
             <a:r>
               <a:rPr lang="pt-PT" sz="2000" i="0" dirty="0"/>
-              <a:t>de sexta, 7 de outubro</a:t>
+              <a:t>24h de sexta, 7 de outubro</a:t>
             </a:r>
             <a:r>
               <a:rPr lang="pt-PT" sz="2000" b="0" i="0" dirty="0"/>
@@ -22209,11 +22201,19 @@
             </a:pPr>
             <a:r>
               <a:rPr lang="pt-PT" sz="2000" b="0" i="0" dirty="0"/>
-              <a:t>Duração: </a:t>
+              <a:t>Duração</a:t>
+            </a:r>
+            <a:r>
+              <a:rPr lang="pt-PT" sz="2000" b="0" i="0"/>
+              <a:t>: </a:t>
+            </a:r>
+            <a:r>
+              <a:rPr lang="pt-PT" sz="2000" i="0"/>
+              <a:t>6 </a:t>
             </a:r>
             <a:r>
               <a:rPr lang="pt-PT" sz="2000" i="0" dirty="0"/>
-              <a:t>12 minutos</a:t>
+              <a:t>minutos</a:t>
             </a:r>
             <a:r>
               <a:rPr lang="pt-PT" sz="2000" b="0" i="0" dirty="0"/>

</xml_diff>